<commit_message>
Änderungen am Design der PP
</commit_message>
<xml_diff>
--- a/Presentation/Eventopia.pptx
+++ b/Presentation/Eventopia.pptx
@@ -7,6 +7,7 @@
   <p:sldIdLst>
     <p:sldId id="256" r:id="rId2"/>
     <p:sldId id="257" r:id="rId3"/>
+    <p:sldId id="258" r:id="rId4"/>
   </p:sldIdLst>
   <p:sldSz cx="12192000" cy="6858000"/>
   <p:notesSz cx="6858000" cy="9144000"/>
@@ -3396,20 +3397,14 @@
           <a:lstStyle/>
           <a:p>
             <a:r>
-              <a:rPr lang="de-DE" sz="7200" b="1" dirty="0" err="1">
+              <a:rPr lang="de-DE" sz="6600" b="1" spc="600" dirty="0">
                 <a:solidFill>
                   <a:schemeClr val="bg1"/>
                 </a:solidFill>
                 <a:latin typeface="Agency FB" panose="020B0503020202020204" pitchFamily="34" charset="0"/>
               </a:rPr>
-              <a:t>Eventopia</a:t>
-            </a:r>
-            <a:endParaRPr lang="de-DE" sz="7200" b="1" dirty="0">
-              <a:solidFill>
-                <a:schemeClr val="bg1"/>
-              </a:solidFill>
-              <a:latin typeface="Agency FB" panose="020B0503020202020204" pitchFamily="34" charset="0"/>
-            </a:endParaRPr>
+              <a:t>EVENTOPIA</a:t>
+            </a:r>
           </a:p>
         </p:txBody>
       </p:sp>
@@ -3445,7 +3440,7 @@
           </a:p>
           <a:p>
             <a:r>
-              <a:rPr lang="de-DE" sz="4000" b="1" dirty="0">
+              <a:rPr lang="de-DE" sz="4000" b="1" spc="300" dirty="0">
                 <a:solidFill>
                   <a:schemeClr val="bg1"/>
                 </a:solidFill>
@@ -4007,6 +4002,137 @@
     <p:extLst>
       <p:ext uri="{BB962C8B-B14F-4D97-AF65-F5344CB8AC3E}">
         <p14:creationId xmlns:p14="http://schemas.microsoft.com/office/powerpoint/2010/main" val="950945517"/>
+      </p:ext>
+    </p:extLst>
+  </p:cSld>
+  <p:clrMapOvr>
+    <a:masterClrMapping/>
+  </p:clrMapOvr>
+</p:sld>
+</file>
+
+<file path=ppt/slides/slide3.xml><?xml version="1.0" encoding="utf-8"?>
+<p:sld xmlns:a="http://schemas.openxmlformats.org/drawingml/2006/main" xmlns:r="http://schemas.openxmlformats.org/officeDocument/2006/relationships" xmlns:p="http://schemas.openxmlformats.org/presentationml/2006/main">
+  <p:cSld>
+    <p:spTree>
+      <p:nvGrpSpPr>
+        <p:cNvPr id="1" name=""/>
+        <p:cNvGrpSpPr/>
+        <p:nvPr/>
+      </p:nvGrpSpPr>
+      <p:grpSpPr>
+        <a:xfrm>
+          <a:off x="0" y="0"/>
+          <a:ext cx="0" cy="0"/>
+          <a:chOff x="0" y="0"/>
+          <a:chExt cx="0" cy="0"/>
+        </a:xfrm>
+      </p:grpSpPr>
+      <p:sp>
+        <p:nvSpPr>
+          <p:cNvPr id="15" name="Ellipse 14">
+            <a:extLst>
+              <a:ext uri="{FF2B5EF4-FFF2-40B4-BE49-F238E27FC236}">
+                <a16:creationId xmlns:a16="http://schemas.microsoft.com/office/drawing/2014/main" id="{0F4B0575-3C54-DEF0-23C8-0176AD192009}"/>
+              </a:ext>
+            </a:extLst>
+          </p:cNvPr>
+          <p:cNvSpPr/>
+          <p:nvPr/>
+        </p:nvSpPr>
+        <p:spPr>
+          <a:xfrm>
+            <a:off x="11049738" y="450761"/>
+            <a:ext cx="318977" cy="308345"/>
+          </a:xfrm>
+          <a:prstGeom prst="ellipse">
+            <a:avLst/>
+          </a:prstGeom>
+          <a:solidFill>
+            <a:schemeClr val="tx1">
+              <a:lumMod val="85000"/>
+              <a:lumOff val="15000"/>
+            </a:schemeClr>
+          </a:solidFill>
+          <a:ln>
+            <a:noFill/>
+          </a:ln>
+        </p:spPr>
+        <p:style>
+          <a:lnRef idx="2">
+            <a:schemeClr val="accent1">
+              <a:shade val="15000"/>
+            </a:schemeClr>
+          </a:lnRef>
+          <a:fillRef idx="1">
+            <a:schemeClr val="accent1"/>
+          </a:fillRef>
+          <a:effectRef idx="0">
+            <a:schemeClr val="accent1"/>
+          </a:effectRef>
+          <a:fontRef idx="minor">
+            <a:schemeClr val="lt1"/>
+          </a:fontRef>
+        </p:style>
+        <p:txBody>
+          <a:bodyPr rtlCol="0" anchor="ctr"/>
+          <a:lstStyle/>
+          <a:p>
+            <a:pPr algn="ctr"/>
+            <a:r>
+              <a:rPr lang="de-DE" sz="1600" dirty="0"/>
+              <a:t>2</a:t>
+            </a:r>
+          </a:p>
+        </p:txBody>
+      </p:sp>
+      <p:sp>
+        <p:nvSpPr>
+          <p:cNvPr id="2" name="Textfeld 1">
+            <a:extLst>
+              <a:ext uri="{FF2B5EF4-FFF2-40B4-BE49-F238E27FC236}">
+                <a16:creationId xmlns:a16="http://schemas.microsoft.com/office/drawing/2014/main" id="{ED284E13-34C3-C091-06AC-8729BC0AB4A4}"/>
+              </a:ext>
+            </a:extLst>
+          </p:cNvPr>
+          <p:cNvSpPr txBox="1"/>
+          <p:nvPr/>
+        </p:nvSpPr>
+        <p:spPr>
+          <a:xfrm>
+            <a:off x="2496296" y="934464"/>
+            <a:ext cx="7199407" cy="584775"/>
+          </a:xfrm>
+          <a:prstGeom prst="rect">
+            <a:avLst/>
+          </a:prstGeom>
+          <a:noFill/>
+        </p:spPr>
+        <p:txBody>
+          <a:bodyPr wrap="none" rtlCol="0">
+            <a:spAutoFit/>
+          </a:bodyPr>
+          <a:lstStyle/>
+          <a:p>
+            <a:r>
+              <a:rPr lang="de-DE" sz="3200" b="1" spc="600" dirty="0">
+                <a:solidFill>
+                  <a:schemeClr val="tx1">
+                    <a:lumMod val="85000"/>
+                    <a:lumOff val="15000"/>
+                  </a:schemeClr>
+                </a:solidFill>
+                <a:latin typeface="Agency FB" panose="020B0503020202020204" pitchFamily="34" charset="0"/>
+              </a:rPr>
+              <a:t>TRIFF UNSER GROSSARTIGES TEAM</a:t>
+            </a:r>
+          </a:p>
+        </p:txBody>
+      </p:sp>
+    </p:spTree>
+    <p:extLst>
+      <p:ext uri="{BB962C8B-B14F-4D97-AF65-F5344CB8AC3E}">
+        <p14:creationId xmlns:p14="http://schemas.microsoft.com/office/powerpoint/2010/main" val="1513527031"/>
       </p:ext>
     </p:extLst>
   </p:cSld>

</xml_diff>